<commit_message>
aula 03 Python IoT_ 20032023
</commit_message>
<xml_diff>
--- a/01 Classes/Aula 03 - Aplicação Cloud Indústria 40 Python IoT Plataforma Arduino Tinkercad.pptx
+++ b/01 Classes/Aula 03 - Aplicação Cloud Indústria 40 Python IoT Plataforma Arduino Tinkercad.pptx
@@ -5,7 +5,7 @@
     <p:sldMasterId id="2147483648" r:id="rId1"/>
   </p:sldMasterIdLst>
   <p:notesMasterIdLst>
-    <p:notesMasterId r:id="rId27"/>
+    <p:notesMasterId r:id="rId28"/>
   </p:notesMasterIdLst>
   <p:sldIdLst>
     <p:sldId id="256" r:id="rId2"/>
@@ -28,11 +28,12 @@
     <p:sldId id="346" r:id="rId19"/>
     <p:sldId id="348" r:id="rId20"/>
     <p:sldId id="349" r:id="rId21"/>
-    <p:sldId id="333" r:id="rId22"/>
-    <p:sldId id="323" r:id="rId23"/>
-    <p:sldId id="345" r:id="rId24"/>
-    <p:sldId id="337" r:id="rId25"/>
-    <p:sldId id="309" r:id="rId26"/>
+    <p:sldId id="365" r:id="rId22"/>
+    <p:sldId id="333" r:id="rId23"/>
+    <p:sldId id="323" r:id="rId24"/>
+    <p:sldId id="363" r:id="rId25"/>
+    <p:sldId id="337" r:id="rId26"/>
+    <p:sldId id="309" r:id="rId27"/>
   </p:sldIdLst>
   <p:sldSz cx="9144000" cy="5143500" type="screen16x9"/>
   <p:notesSz cx="6858000" cy="9144000"/>
@@ -1361,7 +1362,7 @@
     </p:spTree>
     <p:extLst>
       <p:ext uri="{BB962C8B-B14F-4D97-AF65-F5344CB8AC3E}">
-        <p14:creationId xmlns:p14="http://schemas.microsoft.com/office/powerpoint/2010/main" val="585304384"/>
+        <p14:creationId xmlns:p14="http://schemas.microsoft.com/office/powerpoint/2010/main" val="2289714247"/>
       </p:ext>
     </p:extLst>
   </p:cSld>
@@ -1427,7 +1428,7 @@
     </p:spTree>
     <p:extLst>
       <p:ext uri="{BB962C8B-B14F-4D97-AF65-F5344CB8AC3E}">
-        <p14:creationId xmlns:p14="http://schemas.microsoft.com/office/powerpoint/2010/main" val="2709569597"/>
+        <p14:creationId xmlns:p14="http://schemas.microsoft.com/office/powerpoint/2010/main" val="585304384"/>
       </p:ext>
     </p:extLst>
   </p:cSld>
@@ -1493,7 +1494,7 @@
     </p:spTree>
     <p:extLst>
       <p:ext uri="{BB962C8B-B14F-4D97-AF65-F5344CB8AC3E}">
-        <p14:creationId xmlns:p14="http://schemas.microsoft.com/office/powerpoint/2010/main" val="3863516043"/>
+        <p14:creationId xmlns:p14="http://schemas.microsoft.com/office/powerpoint/2010/main" val="2709569597"/>
       </p:ext>
     </p:extLst>
   </p:cSld>
@@ -1504,6 +1505,72 @@
 </file>
 
 <file path=ppt/notesSlides/notesSlide23.xml><?xml version="1.0" encoding="utf-8"?>
+<p:notes xmlns:a="http://schemas.openxmlformats.org/drawingml/2006/main" xmlns:r="http://schemas.openxmlformats.org/officeDocument/2006/relationships" xmlns:p="http://schemas.openxmlformats.org/presentationml/2006/main">
+  <p:cSld>
+    <p:spTree>
+      <p:nvGrpSpPr>
+        <p:cNvPr id="1" name=""/>
+        <p:cNvGrpSpPr/>
+        <p:nvPr/>
+      </p:nvGrpSpPr>
+      <p:grpSpPr>
+        <a:xfrm>
+          <a:off x="0" y="0"/>
+          <a:ext cx="0" cy="0"/>
+          <a:chOff x="0" y="0"/>
+          <a:chExt cx="0" cy="0"/>
+        </a:xfrm>
+      </p:grpSpPr>
+      <p:sp>
+        <p:nvSpPr>
+          <p:cNvPr id="2" name="Espaço Reservado para Imagem de Slide 1"/>
+          <p:cNvSpPr>
+            <a:spLocks noGrp="1" noRot="1" noChangeAspect="1"/>
+          </p:cNvSpPr>
+          <p:nvPr>
+            <p:ph type="sldImg"/>
+          </p:nvPr>
+        </p:nvSpPr>
+        <p:spPr>
+          <a:xfrm>
+            <a:off x="381000" y="685800"/>
+            <a:ext cx="6096000" cy="3429000"/>
+          </a:xfrm>
+        </p:spPr>
+      </p:sp>
+      <p:sp>
+        <p:nvSpPr>
+          <p:cNvPr id="3" name="Espaço Reservado para Anotações 2"/>
+          <p:cNvSpPr>
+            <a:spLocks noGrp="1"/>
+          </p:cNvSpPr>
+          <p:nvPr>
+            <p:ph type="body" idx="1"/>
+          </p:nvPr>
+        </p:nvSpPr>
+        <p:spPr/>
+        <p:txBody>
+          <a:bodyPr/>
+          <a:lstStyle/>
+          <a:p>
+            <a:endParaRPr lang="pt-BR" dirty="0"/>
+          </a:p>
+        </p:txBody>
+      </p:sp>
+    </p:spTree>
+    <p:extLst>
+      <p:ext uri="{BB962C8B-B14F-4D97-AF65-F5344CB8AC3E}">
+        <p14:creationId xmlns:p14="http://schemas.microsoft.com/office/powerpoint/2010/main" val="36342085"/>
+      </p:ext>
+    </p:extLst>
+  </p:cSld>
+  <p:clrMapOvr>
+    <a:masterClrMapping/>
+  </p:clrMapOvr>
+</p:notes>
+</file>
+
+<file path=ppt/notesSlides/notesSlide24.xml><?xml version="1.0" encoding="utf-8"?>
 <p:notes xmlns:a="http://schemas.openxmlformats.org/drawingml/2006/main" xmlns:r="http://schemas.openxmlformats.org/officeDocument/2006/relationships" xmlns:p="http://schemas.openxmlformats.org/presentationml/2006/main">
   <p:cSld>
     <p:spTree>
@@ -7691,7 +7758,7 @@
               <a:t>Criar conta no site do </a:t>
             </a:r>
             <a:r>
-              <a:rPr lang="pt-BR" sz="2000" dirty="0" err="1">
+              <a:rPr lang="pt-BR" sz="2000" b="1" dirty="0" err="1">
                 <a:solidFill>
                   <a:schemeClr val="tx1"/>
                 </a:solidFill>
@@ -8521,33 +8588,33 @@
         </p:spPr>
         <p:txBody>
           <a:bodyPr>
-            <a:normAutofit/>
+            <a:normAutofit fontScale="90000"/>
           </a:bodyPr>
           <a:lstStyle/>
           <a:p>
             <a:r>
-              <a:rPr lang="en-US" b="1" dirty="0" err="1">
+              <a:rPr lang="pt-BR" b="1" dirty="0">
                 <a:solidFill>
                   <a:srgbClr val="0070C0"/>
                 </a:solidFill>
               </a:rPr>
-              <a:t>Leitura</a:t>
-            </a:r>
-            <a:r>
-              <a:rPr lang="en-US" b="1" dirty="0">
+              <a:t>Programa </a:t>
+            </a:r>
+            <a:r>
+              <a:rPr lang="pt-BR" b="1" dirty="0" err="1">
                 <a:solidFill>
                   <a:srgbClr val="0070C0"/>
                 </a:solidFill>
               </a:rPr>
-              <a:t> </a:t>
-            </a:r>
-            <a:r>
-              <a:rPr lang="en-US" b="1" dirty="0" err="1">
+              <a:t>Blink</a:t>
+            </a:r>
+            <a:r>
+              <a:rPr lang="pt-BR" b="1" dirty="0">
                 <a:solidFill>
                   <a:srgbClr val="0070C0"/>
                 </a:solidFill>
               </a:rPr>
-              <a:t>Específica</a:t>
+              <a:t> em Python Arduíno</a:t>
             </a:r>
             <a:endParaRPr lang="en-US" b="1" dirty="0">
               <a:solidFill>
@@ -8569,8 +8636,8 @@
         </p:nvSpPr>
         <p:spPr>
           <a:xfrm>
-            <a:off x="142865" y="1200151"/>
-            <a:ext cx="8865056" cy="3394472"/>
+            <a:off x="142865" y="1200150"/>
+            <a:ext cx="8865056" cy="3737370"/>
           </a:xfrm>
         </p:spPr>
         <p:txBody>
@@ -8583,47 +8650,84 @@
               <a:buNone/>
             </a:pPr>
             <a:r>
-              <a:rPr lang="pt-BR" sz="2400" dirty="0">
-                <a:latin typeface="Times New Roman" panose="02020603050405020304" pitchFamily="18" charset="0"/>
-                <a:cs typeface="Times New Roman" panose="02020603050405020304" pitchFamily="18" charset="0"/>
-              </a:rPr>
-              <a:t>[1] Plataformas Arduíno. </a:t>
+              <a:rPr lang="pt-BR" sz="2000" b="1" dirty="0" err="1">
+                <a:solidFill>
+                  <a:srgbClr val="FF0000"/>
+                </a:solidFill>
+                <a:latin typeface="Times New Roman" panose="02020603050405020304" pitchFamily="18" charset="0"/>
+                <a:cs typeface="Times New Roman" panose="02020603050405020304" pitchFamily="18" charset="0"/>
+              </a:rPr>
+              <a:t>PySerial</a:t>
+            </a:r>
+            <a:r>
+              <a:rPr lang="pt-BR" sz="2000" dirty="0">
+                <a:solidFill>
+                  <a:schemeClr val="tx1"/>
+                </a:solidFill>
+                <a:latin typeface="Times New Roman" panose="02020603050405020304" pitchFamily="18" charset="0"/>
+                <a:cs typeface="Times New Roman" panose="02020603050405020304" pitchFamily="18" charset="0"/>
+              </a:rPr>
+              <a:t>:  </a:t>
+            </a:r>
+            <a:r>
+              <a:rPr lang="pt-BR" sz="2000" dirty="0" err="1">
+                <a:solidFill>
+                  <a:schemeClr val="tx1"/>
+                </a:solidFill>
+                <a:latin typeface="Times New Roman" panose="02020603050405020304" pitchFamily="18" charset="0"/>
+                <a:cs typeface="Times New Roman" panose="02020603050405020304" pitchFamily="18" charset="0"/>
+              </a:rPr>
+              <a:t>pyserial</a:t>
+            </a:r>
+            <a:r>
+              <a:rPr lang="pt-BR" sz="2000" dirty="0">
+                <a:solidFill>
+                  <a:schemeClr val="tx1"/>
+                </a:solidFill>
+                <a:latin typeface="Times New Roman" panose="02020603050405020304" pitchFamily="18" charset="0"/>
+                <a:cs typeface="Times New Roman" panose="02020603050405020304" pitchFamily="18" charset="0"/>
+              </a:rPr>
+              <a:t> é um módulo API </a:t>
+            </a:r>
+            <a:r>
+              <a:rPr lang="pt-BR" sz="2000" dirty="0" err="1">
+                <a:solidFill>
+                  <a:schemeClr val="tx1"/>
+                </a:solidFill>
+                <a:latin typeface="Times New Roman" panose="02020603050405020304" pitchFamily="18" charset="0"/>
+                <a:cs typeface="Times New Roman" panose="02020603050405020304" pitchFamily="18" charset="0"/>
+              </a:rPr>
+              <a:t>pyhton</a:t>
+            </a:r>
+            <a:r>
+              <a:rPr lang="pt-BR" sz="2000" dirty="0">
+                <a:solidFill>
+                  <a:schemeClr val="tx1"/>
+                </a:solidFill>
+                <a:latin typeface="Times New Roman" panose="02020603050405020304" pitchFamily="18" charset="0"/>
+                <a:cs typeface="Times New Roman" panose="02020603050405020304" pitchFamily="18" charset="0"/>
+              </a:rPr>
+              <a:t> para ler e gravar dados seriais.</a:t>
             </a:r>
           </a:p>
           <a:p>
             <a:pPr marL="0" indent="0" algn="just">
               <a:buNone/>
             </a:pPr>
-            <a:r>
-              <a:rPr lang="pt-BR" sz="2400" b="1" dirty="0">
-                <a:solidFill>
-                  <a:srgbClr val="FF0000"/>
-                </a:solidFill>
-                <a:latin typeface="Times New Roman" panose="02020603050405020304" pitchFamily="18" charset="0"/>
-                <a:cs typeface="Times New Roman" panose="02020603050405020304" pitchFamily="18" charset="0"/>
-              </a:rPr>
-              <a:t>Disponível em: </a:t>
-            </a:r>
-            <a:r>
-              <a:rPr lang="pt-BR" sz="2400" dirty="0">
-                <a:latin typeface="Times New Roman" panose="02020603050405020304" pitchFamily="18" charset="0"/>
-                <a:cs typeface="Times New Roman" panose="02020603050405020304" pitchFamily="18" charset="0"/>
-                <a:hlinkClick r:id="rId3"/>
-              </a:rPr>
-              <a:t>https://revistas.rcaap.pt/uiips/article/view/14354</a:t>
-            </a:r>
-            <a:endParaRPr lang="pt-BR" sz="2400" dirty="0">
+            <a:endParaRPr lang="pt-BR" dirty="0">
               <a:latin typeface="Times New Roman" panose="02020603050405020304" pitchFamily="18" charset="0"/>
               <a:cs typeface="Times New Roman" panose="02020603050405020304" pitchFamily="18" charset="0"/>
+              <a:hlinkClick r:id="rId3"/>
             </a:endParaRPr>
           </a:p>
           <a:p>
             <a:pPr marL="0" indent="0" algn="just">
               <a:buNone/>
             </a:pPr>
-            <a:endParaRPr lang="pt-BR" sz="2400" dirty="0">
+            <a:endParaRPr lang="pt-BR" dirty="0">
               <a:latin typeface="Times New Roman" panose="02020603050405020304" pitchFamily="18" charset="0"/>
               <a:cs typeface="Times New Roman" panose="02020603050405020304" pitchFamily="18" charset="0"/>
+              <a:hlinkClick r:id="rId3"/>
             </a:endParaRPr>
           </a:p>
           <a:p>
@@ -8631,56 +8735,16 @@
               <a:buNone/>
             </a:pPr>
             <a:r>
-              <a:rPr lang="pt-BR" sz="2400" dirty="0">
-                <a:latin typeface="Times New Roman" panose="02020603050405020304" pitchFamily="18" charset="0"/>
-                <a:cs typeface="Times New Roman" panose="02020603050405020304" pitchFamily="18" charset="0"/>
-              </a:rPr>
-              <a:t>[2] Plataformas Arduíno </a:t>
-            </a:r>
-            <a:r>
-              <a:rPr lang="pt-BR" sz="2400" dirty="0" err="1">
-                <a:latin typeface="Times New Roman" panose="02020603050405020304" pitchFamily="18" charset="0"/>
-                <a:cs typeface="Times New Roman" panose="02020603050405020304" pitchFamily="18" charset="0"/>
-              </a:rPr>
-              <a:t>Tinkercad</a:t>
-            </a:r>
-            <a:r>
-              <a:rPr lang="pt-BR" sz="2400" dirty="0">
-                <a:latin typeface="Times New Roman" panose="02020603050405020304" pitchFamily="18" charset="0"/>
-                <a:cs typeface="Times New Roman" panose="02020603050405020304" pitchFamily="18" charset="0"/>
-              </a:rPr>
-              <a:t>.</a:t>
-            </a:r>
-          </a:p>
-          <a:p>
-            <a:pPr marL="0" indent="0" algn="just">
-              <a:buNone/>
-            </a:pPr>
-            <a:r>
-              <a:rPr lang="pt-BR" sz="2400" b="1" dirty="0">
-                <a:solidFill>
-                  <a:srgbClr val="FF0000"/>
-                </a:solidFill>
-                <a:latin typeface="Times New Roman" panose="02020603050405020304" pitchFamily="18" charset="0"/>
-                <a:cs typeface="Times New Roman" panose="02020603050405020304" pitchFamily="18" charset="0"/>
-              </a:rPr>
-              <a:t>Disponível em: </a:t>
-            </a:r>
-          </a:p>
-          <a:p>
-            <a:pPr marL="0" indent="0" algn="just">
-              <a:buNone/>
-            </a:pPr>
-            <a:r>
-              <a:rPr lang="pt-BR" sz="2400" dirty="0">
-                <a:latin typeface="Times New Roman" panose="02020603050405020304" pitchFamily="18" charset="0"/>
-                <a:cs typeface="Times New Roman" panose="02020603050405020304" pitchFamily="18" charset="0"/>
-                <a:hlinkClick r:id="rId4"/>
-              </a:rPr>
-              <a:t>https://www.makerzine.com.br/programacao/primeiros-passos-com-tinkercad-circuits-2-exemplos/</a:t>
-            </a:r>
-            <a:endParaRPr lang="pt-BR" sz="2400" dirty="0">
-              <a:latin typeface="Calibri" panose="020F0502020204030204" pitchFamily="34" charset="0"/>
+              <a:rPr lang="pt-BR" dirty="0">
+                <a:latin typeface="Times New Roman" panose="02020603050405020304" pitchFamily="18" charset="0"/>
+                <a:cs typeface="Times New Roman" panose="02020603050405020304" pitchFamily="18" charset="0"/>
+                <a:hlinkClick r:id="rId3"/>
+              </a:rPr>
+              <a:t>https://roboindia.com/tutorials/python-with-arduino/</a:t>
+            </a:r>
+            <a:endParaRPr lang="pt-BR" dirty="0">
+              <a:latin typeface="Times New Roman" panose="02020603050405020304" pitchFamily="18" charset="0"/>
+              <a:cs typeface="Times New Roman" panose="02020603050405020304" pitchFamily="18" charset="0"/>
             </a:endParaRPr>
           </a:p>
         </p:txBody>
@@ -8688,7 +8752,7 @@
     </p:spTree>
     <p:extLst>
       <p:ext uri="{BB962C8B-B14F-4D97-AF65-F5344CB8AC3E}">
-        <p14:creationId xmlns:p14="http://schemas.microsoft.com/office/powerpoint/2010/main" val="3680270425"/>
+        <p14:creationId xmlns:p14="http://schemas.microsoft.com/office/powerpoint/2010/main" val="3832630866"/>
       </p:ext>
     </p:extLst>
   </p:cSld>
@@ -8744,7 +8808,7 @@
                   <a:srgbClr val="0070C0"/>
                 </a:solidFill>
               </a:rPr>
-              <a:t>Aprenda</a:t>
+              <a:t>Leitura</a:t>
             </a:r>
             <a:r>
               <a:rPr lang="en-US" b="1" dirty="0">
@@ -8752,8 +8816,21 @@
                   <a:srgbClr val="0070C0"/>
                 </a:solidFill>
               </a:rPr>
-              <a:t>+</a:t>
-            </a:r>
+              <a:t> </a:t>
+            </a:r>
+            <a:r>
+              <a:rPr lang="en-US" b="1" dirty="0" err="1">
+                <a:solidFill>
+                  <a:srgbClr val="0070C0"/>
+                </a:solidFill>
+              </a:rPr>
+              <a:t>Específica</a:t>
+            </a:r>
+            <a:endParaRPr lang="en-US" b="1" dirty="0">
+              <a:solidFill>
+                <a:srgbClr val="0070C0"/>
+              </a:solidFill>
+            </a:endParaRPr>
           </a:p>
         </p:txBody>
       </p:sp>
@@ -8769,8 +8846,8 @@
         </p:nvSpPr>
         <p:spPr>
           <a:xfrm>
-            <a:off x="142865" y="1200150"/>
-            <a:ext cx="8865056" cy="3737370"/>
+            <a:off x="142865" y="1200151"/>
+            <a:ext cx="8865056" cy="3394472"/>
           </a:xfrm>
         </p:spPr>
         <p:txBody>
@@ -8787,7 +8864,7 @@
                 <a:latin typeface="Times New Roman" panose="02020603050405020304" pitchFamily="18" charset="0"/>
                 <a:cs typeface="Times New Roman" panose="02020603050405020304" pitchFamily="18" charset="0"/>
               </a:rPr>
-              <a:t>[1] Plataformas Arduíno.</a:t>
+              <a:t>[1] Plataformas Arduíno. </a:t>
             </a:r>
           </a:p>
           <a:p>
@@ -8810,7 +8887,7 @@
                 <a:cs typeface="Times New Roman" panose="02020603050405020304" pitchFamily="18" charset="0"/>
                 <a:hlinkClick r:id="rId3"/>
               </a:rPr>
-              <a:t>https://youtu.be/QO3XR_s9rL0</a:t>
+              <a:t>https://revistas.rcaap.pt/uiips/article/view/14354</a:t>
             </a:r>
             <a:endParaRPr lang="pt-BR" sz="2400" dirty="0">
               <a:latin typeface="Times New Roman" panose="02020603050405020304" pitchFamily="18" charset="0"/>
@@ -8849,7 +8926,7 @@
                 <a:latin typeface="Times New Roman" panose="02020603050405020304" pitchFamily="18" charset="0"/>
                 <a:cs typeface="Times New Roman" panose="02020603050405020304" pitchFamily="18" charset="0"/>
               </a:rPr>
-              <a:t>. </a:t>
+              <a:t>.</a:t>
             </a:r>
           </a:p>
           <a:p>
@@ -8866,26 +8943,21 @@
               </a:rPr>
               <a:t>Disponível em: </a:t>
             </a:r>
+          </a:p>
+          <a:p>
+            <a:pPr marL="0" indent="0" algn="just">
+              <a:buNone/>
+            </a:pPr>
             <a:r>
               <a:rPr lang="pt-BR" sz="2400" dirty="0">
                 <a:latin typeface="Times New Roman" panose="02020603050405020304" pitchFamily="18" charset="0"/>
                 <a:cs typeface="Times New Roman" panose="02020603050405020304" pitchFamily="18" charset="0"/>
                 <a:hlinkClick r:id="rId4"/>
               </a:rPr>
-              <a:t>https://youtu.be/d70gjJgyXSA</a:t>
+              <a:t>https://www.makerzine.com.br/programacao/primeiros-passos-com-tinkercad-circuits-2-exemplos/</a:t>
             </a:r>
             <a:endParaRPr lang="pt-BR" sz="2400" dirty="0">
-              <a:latin typeface="Times New Roman" panose="02020603050405020304" pitchFamily="18" charset="0"/>
-              <a:cs typeface="Times New Roman" panose="02020603050405020304" pitchFamily="18" charset="0"/>
-            </a:endParaRPr>
-          </a:p>
-          <a:p>
-            <a:pPr marL="0" indent="0" algn="just">
-              <a:buNone/>
-            </a:pPr>
-            <a:endParaRPr lang="pt-BR" sz="2400" dirty="0">
-              <a:latin typeface="Times New Roman" panose="02020603050405020304" pitchFamily="18" charset="0"/>
-              <a:cs typeface="Times New Roman" panose="02020603050405020304" pitchFamily="18" charset="0"/>
+              <a:latin typeface="Calibri" panose="020F0502020204030204" pitchFamily="34" charset="0"/>
             </a:endParaRPr>
           </a:p>
         </p:txBody>
@@ -8893,7 +8965,7 @@
     </p:spTree>
     <p:extLst>
       <p:ext uri="{BB962C8B-B14F-4D97-AF65-F5344CB8AC3E}">
-        <p14:creationId xmlns:p14="http://schemas.microsoft.com/office/powerpoint/2010/main" val="2747596967"/>
+        <p14:creationId xmlns:p14="http://schemas.microsoft.com/office/powerpoint/2010/main" val="3680270425"/>
       </p:ext>
     </p:extLst>
   </p:cSld>
@@ -8949,7 +9021,7 @@
                   <a:srgbClr val="0070C0"/>
                 </a:solidFill>
               </a:rPr>
-              <a:t>Dinâmica</a:t>
+              <a:t>Aprenda</a:t>
             </a:r>
             <a:r>
               <a:rPr lang="en-US" b="1" dirty="0">
@@ -8957,21 +9029,8 @@
                   <a:srgbClr val="0070C0"/>
                 </a:solidFill>
               </a:rPr>
-              <a:t>/</a:t>
-            </a:r>
-            <a:r>
-              <a:rPr lang="en-US" b="1" dirty="0" err="1">
-                <a:solidFill>
-                  <a:srgbClr val="0070C0"/>
-                </a:solidFill>
-              </a:rPr>
-              <a:t>Atividades</a:t>
-            </a:r>
-            <a:endParaRPr lang="en-US" b="1" dirty="0">
-              <a:solidFill>
-                <a:srgbClr val="0070C0"/>
-              </a:solidFill>
-            </a:endParaRPr>
+              <a:t>+</a:t>
+            </a:r>
           </a:p>
         </p:txBody>
       </p:sp>
@@ -8987,8 +9046,8 @@
         </p:nvSpPr>
         <p:spPr>
           <a:xfrm>
-            <a:off x="139472" y="1063230"/>
-            <a:ext cx="8865056" cy="3606305"/>
+            <a:off x="142865" y="1200150"/>
+            <a:ext cx="8865056" cy="3737370"/>
           </a:xfrm>
         </p:spPr>
         <p:txBody>
@@ -9005,8 +9064,35 @@
                 <a:latin typeface="Times New Roman" panose="02020603050405020304" pitchFamily="18" charset="0"/>
                 <a:cs typeface="Times New Roman" panose="02020603050405020304" pitchFamily="18" charset="0"/>
               </a:rPr>
-              <a:t>Exercícios (Atividade Verificadora de Aprendizagem)</a:t>
-            </a:r>
+              <a:t>[1] Plataformas Arduíno.</a:t>
+            </a:r>
+          </a:p>
+          <a:p>
+            <a:pPr marL="0" indent="0" algn="just">
+              <a:buNone/>
+            </a:pPr>
+            <a:r>
+              <a:rPr lang="pt-BR" sz="2400" b="1" dirty="0">
+                <a:solidFill>
+                  <a:srgbClr val="FF0000"/>
+                </a:solidFill>
+                <a:latin typeface="Times New Roman" panose="02020603050405020304" pitchFamily="18" charset="0"/>
+                <a:cs typeface="Times New Roman" panose="02020603050405020304" pitchFamily="18" charset="0"/>
+              </a:rPr>
+              <a:t>Disponível em: </a:t>
+            </a:r>
+            <a:r>
+              <a:rPr lang="pt-BR" sz="2400" dirty="0">
+                <a:latin typeface="Times New Roman" panose="02020603050405020304" pitchFamily="18" charset="0"/>
+                <a:cs typeface="Times New Roman" panose="02020603050405020304" pitchFamily="18" charset="0"/>
+                <a:hlinkClick r:id="rId3"/>
+              </a:rPr>
+              <a:t>https://youtu.be/QO3XR_s9rL0</a:t>
+            </a:r>
+            <a:endParaRPr lang="pt-BR" sz="2400" dirty="0">
+              <a:latin typeface="Times New Roman" panose="02020603050405020304" pitchFamily="18" charset="0"/>
+              <a:cs typeface="Times New Roman" panose="02020603050405020304" pitchFamily="18" charset="0"/>
+            </a:endParaRPr>
           </a:p>
           <a:p>
             <a:pPr marL="0" indent="0" algn="just">
@@ -9026,8 +9112,49 @@
                 <a:latin typeface="Times New Roman" panose="02020603050405020304" pitchFamily="18" charset="0"/>
                 <a:cs typeface="Times New Roman" panose="02020603050405020304" pitchFamily="18" charset="0"/>
               </a:rPr>
-              <a:t>Reproduzir o projeto de circuito elétrico do vídeo abaixo:</a:t>
-            </a:r>
+              <a:t>[2] Plataformas Arduíno </a:t>
+            </a:r>
+            <a:r>
+              <a:rPr lang="pt-BR" sz="2400" dirty="0" err="1">
+                <a:latin typeface="Times New Roman" panose="02020603050405020304" pitchFamily="18" charset="0"/>
+                <a:cs typeface="Times New Roman" panose="02020603050405020304" pitchFamily="18" charset="0"/>
+              </a:rPr>
+              <a:t>Tinkercad</a:t>
+            </a:r>
+            <a:r>
+              <a:rPr lang="pt-BR" sz="2400" dirty="0">
+                <a:latin typeface="Times New Roman" panose="02020603050405020304" pitchFamily="18" charset="0"/>
+                <a:cs typeface="Times New Roman" panose="02020603050405020304" pitchFamily="18" charset="0"/>
+              </a:rPr>
+              <a:t>. </a:t>
+            </a:r>
+          </a:p>
+          <a:p>
+            <a:pPr marL="0" indent="0" algn="just">
+              <a:buNone/>
+            </a:pPr>
+            <a:r>
+              <a:rPr lang="pt-BR" sz="2400" b="1" dirty="0">
+                <a:solidFill>
+                  <a:srgbClr val="FF0000"/>
+                </a:solidFill>
+                <a:latin typeface="Times New Roman" panose="02020603050405020304" pitchFamily="18" charset="0"/>
+                <a:cs typeface="Times New Roman" panose="02020603050405020304" pitchFamily="18" charset="0"/>
+              </a:rPr>
+              <a:t>Disponível em: </a:t>
+            </a:r>
+            <a:r>
+              <a:rPr lang="pt-BR" sz="2400" dirty="0">
+                <a:latin typeface="Times New Roman" panose="02020603050405020304" pitchFamily="18" charset="0"/>
+                <a:cs typeface="Times New Roman" panose="02020603050405020304" pitchFamily="18" charset="0"/>
+                <a:hlinkClick r:id="rId4"/>
+              </a:rPr>
+              <a:t>https://youtu.be/d70gjJgyXSA</a:t>
+            </a:r>
+            <a:endParaRPr lang="pt-BR" sz="2400" dirty="0">
+              <a:latin typeface="Times New Roman" panose="02020603050405020304" pitchFamily="18" charset="0"/>
+              <a:cs typeface="Times New Roman" panose="02020603050405020304" pitchFamily="18" charset="0"/>
+            </a:endParaRPr>
           </a:p>
           <a:p>
             <a:pPr marL="0" indent="0" algn="just">
@@ -9038,47 +9165,12 @@
               <a:cs typeface="Times New Roman" panose="02020603050405020304" pitchFamily="18" charset="0"/>
             </a:endParaRPr>
           </a:p>
-          <a:p>
-            <a:pPr marL="0" indent="0" algn="just">
-              <a:buNone/>
-            </a:pPr>
-            <a:r>
-              <a:rPr lang="pt-BR" sz="2400" dirty="0">
-                <a:latin typeface="Times New Roman" panose="02020603050405020304" pitchFamily="18" charset="0"/>
-                <a:cs typeface="Times New Roman" panose="02020603050405020304" pitchFamily="18" charset="0"/>
-                <a:hlinkClick r:id="rId3"/>
-              </a:rPr>
-              <a:t>https://youtu.be/d70gjJgyXSA</a:t>
-            </a:r>
-            <a:endParaRPr lang="pt-BR" sz="2400" dirty="0">
-              <a:latin typeface="Times New Roman" panose="02020603050405020304" pitchFamily="18" charset="0"/>
-              <a:cs typeface="Times New Roman" panose="02020603050405020304" pitchFamily="18" charset="0"/>
-            </a:endParaRPr>
-          </a:p>
-          <a:p>
-            <a:pPr marL="0" indent="0" algn="just">
-              <a:buNone/>
-            </a:pPr>
-            <a:endParaRPr lang="pt-BR" sz="2400" dirty="0">
-              <a:latin typeface="Times New Roman" panose="02020603050405020304" pitchFamily="18" charset="0"/>
-              <a:cs typeface="Times New Roman" panose="02020603050405020304" pitchFamily="18" charset="0"/>
-            </a:endParaRPr>
-          </a:p>
-          <a:p>
-            <a:pPr marL="0" indent="0" algn="just">
-              <a:buNone/>
-            </a:pPr>
-            <a:endParaRPr lang="pt-BR" sz="2400" dirty="0">
-              <a:latin typeface="Times New Roman" panose="02020603050405020304" pitchFamily="18" charset="0"/>
-              <a:cs typeface="Times New Roman" panose="02020603050405020304" pitchFamily="18" charset="0"/>
-            </a:endParaRPr>
-          </a:p>
         </p:txBody>
       </p:sp>
     </p:spTree>
     <p:extLst>
       <p:ext uri="{BB962C8B-B14F-4D97-AF65-F5344CB8AC3E}">
-        <p14:creationId xmlns:p14="http://schemas.microsoft.com/office/powerpoint/2010/main" val="1397642976"/>
+        <p14:creationId xmlns:p14="http://schemas.microsoft.com/office/powerpoint/2010/main" val="2747596967"/>
       </p:ext>
     </p:extLst>
   </p:cSld>
@@ -9134,6 +9226,191 @@
                   <a:srgbClr val="0070C0"/>
                 </a:solidFill>
               </a:rPr>
+              <a:t>Dinâmica</a:t>
+            </a:r>
+            <a:r>
+              <a:rPr lang="en-US" b="1" dirty="0">
+                <a:solidFill>
+                  <a:srgbClr val="0070C0"/>
+                </a:solidFill>
+              </a:rPr>
+              <a:t>/</a:t>
+            </a:r>
+            <a:r>
+              <a:rPr lang="en-US" b="1" dirty="0" err="1">
+                <a:solidFill>
+                  <a:srgbClr val="0070C0"/>
+                </a:solidFill>
+              </a:rPr>
+              <a:t>Atividades</a:t>
+            </a:r>
+            <a:endParaRPr lang="en-US" b="1" dirty="0">
+              <a:solidFill>
+                <a:srgbClr val="0070C0"/>
+              </a:solidFill>
+            </a:endParaRPr>
+          </a:p>
+        </p:txBody>
+      </p:sp>
+      <p:sp>
+        <p:nvSpPr>
+          <p:cNvPr id="8" name="Text Placeholder 2"/>
+          <p:cNvSpPr>
+            <a:spLocks noGrp="1"/>
+          </p:cNvSpPr>
+          <p:nvPr>
+            <p:ph type="body" sz="half" idx="1"/>
+          </p:nvPr>
+        </p:nvSpPr>
+        <p:spPr>
+          <a:xfrm>
+            <a:off x="139472" y="1063230"/>
+            <a:ext cx="8865056" cy="3606305"/>
+          </a:xfrm>
+        </p:spPr>
+        <p:txBody>
+          <a:bodyPr>
+            <a:noAutofit/>
+          </a:bodyPr>
+          <a:lstStyle/>
+          <a:p>
+            <a:pPr marL="0" indent="0" algn="just">
+              <a:buNone/>
+            </a:pPr>
+            <a:r>
+              <a:rPr lang="pt-BR" sz="2400" dirty="0">
+                <a:latin typeface="Times New Roman" panose="02020603050405020304" pitchFamily="18" charset="0"/>
+                <a:cs typeface="Times New Roman" panose="02020603050405020304" pitchFamily="18" charset="0"/>
+              </a:rPr>
+              <a:t>Exercícios (Atividade Verificadora de Aprendizagem)</a:t>
+            </a:r>
+          </a:p>
+          <a:p>
+            <a:pPr marL="0" indent="0" algn="just">
+              <a:buNone/>
+            </a:pPr>
+            <a:endParaRPr lang="pt-BR" sz="2400" dirty="0">
+              <a:latin typeface="Times New Roman" panose="02020603050405020304" pitchFamily="18" charset="0"/>
+              <a:cs typeface="Times New Roman" panose="02020603050405020304" pitchFamily="18" charset="0"/>
+            </a:endParaRPr>
+          </a:p>
+          <a:p>
+            <a:pPr marL="0" indent="0" algn="just">
+              <a:buNone/>
+            </a:pPr>
+            <a:r>
+              <a:rPr lang="pt-BR" sz="2400" dirty="0">
+                <a:latin typeface="Times New Roman" panose="02020603050405020304" pitchFamily="18" charset="0"/>
+                <a:cs typeface="Times New Roman" panose="02020603050405020304" pitchFamily="18" charset="0"/>
+              </a:rPr>
+              <a:t>Reproduzir o projeto de circuito elétrico do vídeo abaixo:</a:t>
+            </a:r>
+          </a:p>
+          <a:p>
+            <a:pPr marL="0" indent="0" algn="just">
+              <a:buNone/>
+            </a:pPr>
+            <a:endParaRPr lang="pt-BR" sz="2400" dirty="0">
+              <a:latin typeface="Times New Roman" panose="02020603050405020304" pitchFamily="18" charset="0"/>
+              <a:cs typeface="Times New Roman" panose="02020603050405020304" pitchFamily="18" charset="0"/>
+            </a:endParaRPr>
+          </a:p>
+          <a:p>
+            <a:pPr marL="0" indent="0" algn="just">
+              <a:buNone/>
+            </a:pPr>
+            <a:r>
+              <a:rPr lang="pt-BR" sz="2400" dirty="0">
+                <a:latin typeface="Times New Roman" panose="02020603050405020304" pitchFamily="18" charset="0"/>
+                <a:cs typeface="Times New Roman" panose="02020603050405020304" pitchFamily="18" charset="0"/>
+                <a:hlinkClick r:id="rId3"/>
+              </a:rPr>
+              <a:t>https://youtu.be/d70gjJgyXSA</a:t>
+            </a:r>
+            <a:endParaRPr lang="pt-BR" sz="2400" dirty="0">
+              <a:latin typeface="Times New Roman" panose="02020603050405020304" pitchFamily="18" charset="0"/>
+              <a:cs typeface="Times New Roman" panose="02020603050405020304" pitchFamily="18" charset="0"/>
+            </a:endParaRPr>
+          </a:p>
+          <a:p>
+            <a:pPr marL="0" indent="0" algn="just">
+              <a:buNone/>
+            </a:pPr>
+            <a:endParaRPr lang="pt-BR" sz="2400" dirty="0">
+              <a:latin typeface="Times New Roman" panose="02020603050405020304" pitchFamily="18" charset="0"/>
+              <a:cs typeface="Times New Roman" panose="02020603050405020304" pitchFamily="18" charset="0"/>
+            </a:endParaRPr>
+          </a:p>
+          <a:p>
+            <a:pPr marL="0" indent="0" algn="just">
+              <a:buNone/>
+            </a:pPr>
+            <a:endParaRPr lang="pt-BR" sz="2400" dirty="0">
+              <a:latin typeface="Times New Roman" panose="02020603050405020304" pitchFamily="18" charset="0"/>
+              <a:cs typeface="Times New Roman" panose="02020603050405020304" pitchFamily="18" charset="0"/>
+            </a:endParaRPr>
+          </a:p>
+        </p:txBody>
+      </p:sp>
+    </p:spTree>
+    <p:extLst>
+      <p:ext uri="{BB962C8B-B14F-4D97-AF65-F5344CB8AC3E}">
+        <p14:creationId xmlns:p14="http://schemas.microsoft.com/office/powerpoint/2010/main" val="1508984230"/>
+      </p:ext>
+    </p:extLst>
+  </p:cSld>
+  <p:clrMapOvr>
+    <a:masterClrMapping/>
+  </p:clrMapOvr>
+  <p:transition spd="med"/>
+</p:sld>
+</file>
+
+<file path=ppt/slides/slide25.xml><?xml version="1.0" encoding="utf-8"?>
+<p:sld xmlns:a="http://schemas.openxmlformats.org/drawingml/2006/main" xmlns:r="http://schemas.openxmlformats.org/officeDocument/2006/relationships" xmlns:p="http://schemas.openxmlformats.org/presentationml/2006/main">
+  <p:cSld>
+    <p:spTree>
+      <p:nvGrpSpPr>
+        <p:cNvPr id="1" name=""/>
+        <p:cNvGrpSpPr/>
+        <p:nvPr/>
+      </p:nvGrpSpPr>
+      <p:grpSpPr>
+        <a:xfrm>
+          <a:off x="0" y="0"/>
+          <a:ext cx="0" cy="0"/>
+          <a:chOff x="0" y="0"/>
+          <a:chExt cx="0" cy="0"/>
+        </a:xfrm>
+      </p:grpSpPr>
+      <p:sp>
+        <p:nvSpPr>
+          <p:cNvPr id="6" name="Title 1"/>
+          <p:cNvSpPr>
+            <a:spLocks noGrp="1"/>
+          </p:cNvSpPr>
+          <p:nvPr>
+            <p:ph type="title"/>
+          </p:nvPr>
+        </p:nvSpPr>
+        <p:spPr>
+          <a:xfrm>
+            <a:off x="457200" y="205980"/>
+            <a:ext cx="8229600" cy="857251"/>
+          </a:xfrm>
+        </p:spPr>
+        <p:txBody>
+          <a:bodyPr>
+            <a:normAutofit/>
+          </a:bodyPr>
+          <a:lstStyle/>
+          <a:p>
+            <a:r>
+              <a:rPr lang="en-US" b="1" dirty="0" err="1">
+                <a:solidFill>
+                  <a:srgbClr val="0070C0"/>
+                </a:solidFill>
+              </a:rPr>
               <a:t>Referências</a:t>
             </a:r>
             <a:r>
@@ -9428,7 +9705,7 @@
 </p:sld>
 </file>
 
-<file path=ppt/slides/slide25.xml><?xml version="1.0" encoding="utf-8"?>
+<file path=ppt/slides/slide26.xml><?xml version="1.0" encoding="utf-8"?>
 <p:sld xmlns:a="http://schemas.openxmlformats.org/drawingml/2006/main" xmlns:r="http://schemas.openxmlformats.org/officeDocument/2006/relationships" xmlns:p="http://schemas.openxmlformats.org/presentationml/2006/main">
   <p:cSld>
     <p:spTree>
@@ -9992,7 +10269,24 @@
                 <a:latin typeface="Times New Roman" panose="02020603050405020304" pitchFamily="18" charset="0"/>
                 <a:cs typeface="Times New Roman" panose="02020603050405020304" pitchFamily="18" charset="0"/>
               </a:rPr>
-              <a:t>livre e de placa única, projetada com um microcontrolador Atmel AVR com suporte de entrada/saída embutido, uma linguagem de programação padrão, a qual tem origem em </a:t>
+              <a:t>livre e de placa única, projetada com um microcontrolador Atmel AVR com suporte de entrada/saída embutido, uma </a:t>
+            </a:r>
+            <a:r>
+              <a:rPr lang="pt-BR" sz="2000" b="1" dirty="0">
+                <a:solidFill>
+                  <a:srgbClr val="FF0000"/>
+                </a:solidFill>
+                <a:latin typeface="Times New Roman" panose="02020603050405020304" pitchFamily="18" charset="0"/>
+                <a:cs typeface="Times New Roman" panose="02020603050405020304" pitchFamily="18" charset="0"/>
+              </a:rPr>
+              <a:t>linguagem de programação padrão</a:t>
+            </a:r>
+            <a:r>
+              <a:rPr lang="pt-BR" sz="2000" dirty="0">
+                <a:latin typeface="Times New Roman" panose="02020603050405020304" pitchFamily="18" charset="0"/>
+                <a:cs typeface="Times New Roman" panose="02020603050405020304" pitchFamily="18" charset="0"/>
+              </a:rPr>
+              <a:t>, a qual tem origem em </a:t>
             </a:r>
             <a:r>
               <a:rPr lang="pt-BR" sz="2000" b="1" dirty="0" err="1">

</xml_diff>

<commit_message>
aula 03 Python IoT ajuste 21032023
</commit_message>
<xml_diff>
--- a/01 Classes/Aula 03 - Aplicação Cloud Indústria 40 Python IoT Plataforma Arduino Tinkercad.pptx
+++ b/01 Classes/Aula 03 - Aplicação Cloud Indústria 40 Python IoT Plataforma Arduino Tinkercad.pptx
@@ -6634,6 +6634,21 @@
               <a:buNone/>
             </a:pPr>
             <a:r>
+              <a:rPr lang="pt-BR" sz="1800" b="1" dirty="0">
+                <a:solidFill>
+                  <a:schemeClr val="tx1"/>
+                </a:solidFill>
+                <a:latin typeface="Times New Roman" panose="02020603050405020304" pitchFamily="18" charset="0"/>
+                <a:cs typeface="Times New Roman" panose="02020603050405020304" pitchFamily="18" charset="0"/>
+              </a:rPr>
+              <a:t>#define tempo 1000</a:t>
+            </a:r>
+          </a:p>
+          <a:p>
+            <a:pPr marL="0" indent="0" algn="just">
+              <a:buNone/>
+            </a:pPr>
+            <a:r>
               <a:rPr lang="pt-BR" sz="1800" b="1" dirty="0" err="1">
                 <a:solidFill>
                   <a:schemeClr val="tx1"/>
@@ -6838,41 +6853,31 @@
                 <a:latin typeface="Times New Roman" panose="02020603050405020304" pitchFamily="18" charset="0"/>
                 <a:cs typeface="Times New Roman" panose="02020603050405020304" pitchFamily="18" charset="0"/>
               </a:rPr>
-              <a:t>(</a:t>
-            </a:r>
-            <a:r>
-              <a:rPr lang="pt-BR" sz="1800" dirty="0" err="1">
-                <a:solidFill>
-                  <a:schemeClr val="tx1"/>
-                </a:solidFill>
-                <a:latin typeface="Times New Roman" panose="02020603050405020304" pitchFamily="18" charset="0"/>
-                <a:cs typeface="Times New Roman" panose="02020603050405020304" pitchFamily="18" charset="0"/>
-              </a:rPr>
-              <a:t>leg</a:t>
-            </a:r>
-            <a:r>
-              <a:rPr lang="pt-BR" sz="1800" dirty="0">
-                <a:solidFill>
-                  <a:schemeClr val="tx1"/>
-                </a:solidFill>
-                <a:latin typeface="Times New Roman" panose="02020603050405020304" pitchFamily="18" charset="0"/>
-                <a:cs typeface="Times New Roman" panose="02020603050405020304" pitchFamily="18" charset="0"/>
-              </a:rPr>
-              <a:t>, HIGH); // Led </a:t>
-            </a:r>
-            <a:r>
-              <a:rPr lang="pt-BR" sz="1800" dirty="0" err="1">
-                <a:solidFill>
-                  <a:schemeClr val="tx1"/>
+              <a:t>(led, HIGH); // </a:t>
+            </a:r>
+            <a:r>
+              <a:rPr lang="pt-BR" sz="1800" b="1" dirty="0">
+                <a:solidFill>
+                  <a:srgbClr val="FF0000"/>
+                </a:solidFill>
+                <a:latin typeface="Times New Roman" panose="02020603050405020304" pitchFamily="18" charset="0"/>
+                <a:cs typeface="Times New Roman" panose="02020603050405020304" pitchFamily="18" charset="0"/>
+              </a:rPr>
+              <a:t>Led </a:t>
+            </a:r>
+            <a:r>
+              <a:rPr lang="pt-BR" sz="1800" b="1" dirty="0" err="1">
+                <a:solidFill>
+                  <a:srgbClr val="FF0000"/>
                 </a:solidFill>
                 <a:latin typeface="Times New Roman" panose="02020603050405020304" pitchFamily="18" charset="0"/>
                 <a:cs typeface="Times New Roman" panose="02020603050405020304" pitchFamily="18" charset="0"/>
               </a:rPr>
               <a:t>On</a:t>
             </a:r>
-            <a:endParaRPr lang="pt-BR" sz="1800" dirty="0">
+            <a:endParaRPr lang="pt-BR" sz="1800" b="1" dirty="0">
               <a:solidFill>
-                <a:schemeClr val="tx1"/>
+                <a:srgbClr val="FF0000"/>
               </a:solidFill>
               <a:latin typeface="Times New Roman" panose="02020603050405020304" pitchFamily="18" charset="0"/>
               <a:cs typeface="Times New Roman" panose="02020603050405020304" pitchFamily="18" charset="0"/>
@@ -6910,7 +6915,7 @@
                 <a:latin typeface="Times New Roman" panose="02020603050405020304" pitchFamily="18" charset="0"/>
                 <a:cs typeface="Times New Roman" panose="02020603050405020304" pitchFamily="18" charset="0"/>
               </a:rPr>
-              <a:t>(1000); // Espera 1s</a:t>
+              <a:t>(tempo); // Espera 1s</a:t>
             </a:r>
           </a:p>
           <a:p>
@@ -6945,18 +6950,23 @@
                 <a:latin typeface="Times New Roman" panose="02020603050405020304" pitchFamily="18" charset="0"/>
                 <a:cs typeface="Times New Roman" panose="02020603050405020304" pitchFamily="18" charset="0"/>
               </a:rPr>
-              <a:t>(</a:t>
-            </a:r>
-            <a:r>
-              <a:rPr lang="pt-BR" sz="1800" dirty="0" err="1">
-                <a:solidFill>
-                  <a:schemeClr val="tx1"/>
-                </a:solidFill>
-                <a:latin typeface="Times New Roman" panose="02020603050405020304" pitchFamily="18" charset="0"/>
-                <a:cs typeface="Times New Roman" panose="02020603050405020304" pitchFamily="18" charset="0"/>
-              </a:rPr>
-              <a:t>leg</a:t>
-            </a:r>
+              <a:t>(led, LOW); // </a:t>
+            </a:r>
+            <a:r>
+              <a:rPr lang="pt-BR" sz="1800" b="1" dirty="0">
+                <a:solidFill>
+                  <a:srgbClr val="FF0000"/>
+                </a:solidFill>
+                <a:latin typeface="Times New Roman" panose="02020603050405020304" pitchFamily="18" charset="0"/>
+                <a:cs typeface="Times New Roman" panose="02020603050405020304" pitchFamily="18" charset="0"/>
+              </a:rPr>
+              <a:t>Led Off</a:t>
+            </a:r>
+          </a:p>
+          <a:p>
+            <a:pPr marL="0" indent="0" algn="just">
+              <a:buNone/>
+            </a:pPr>
             <a:r>
               <a:rPr lang="pt-BR" sz="1800" dirty="0">
                 <a:solidFill>
@@ -6965,13 +6975,18 @@
                 <a:latin typeface="Times New Roman" panose="02020603050405020304" pitchFamily="18" charset="0"/>
                 <a:cs typeface="Times New Roman" panose="02020603050405020304" pitchFamily="18" charset="0"/>
               </a:rPr>
-              <a:t>, LOW); // Led Off</a:t>
-            </a:r>
-          </a:p>
-          <a:p>
-            <a:pPr marL="0" indent="0" algn="just">
-              <a:buNone/>
-            </a:pPr>
+              <a:t>   </a:t>
+            </a:r>
+            <a:r>
+              <a:rPr lang="pt-BR" sz="1800" b="1" dirty="0">
+                <a:solidFill>
+                  <a:schemeClr val="tx1"/>
+                </a:solidFill>
+                <a:latin typeface="Times New Roman" panose="02020603050405020304" pitchFamily="18" charset="0"/>
+                <a:cs typeface="Times New Roman" panose="02020603050405020304" pitchFamily="18" charset="0"/>
+              </a:rPr>
+              <a:t>delay</a:t>
+            </a:r>
             <a:r>
               <a:rPr lang="pt-BR" sz="1800" dirty="0">
                 <a:solidFill>
@@ -6980,42 +6995,7 @@
                 <a:latin typeface="Times New Roman" panose="02020603050405020304" pitchFamily="18" charset="0"/>
                 <a:cs typeface="Times New Roman" panose="02020603050405020304" pitchFamily="18" charset="0"/>
               </a:rPr>
-              <a:t>   </a:t>
-            </a:r>
-            <a:r>
-              <a:rPr lang="pt-BR" sz="1800" b="1" dirty="0">
-                <a:solidFill>
-                  <a:schemeClr val="tx1"/>
-                </a:solidFill>
-                <a:latin typeface="Times New Roman" panose="02020603050405020304" pitchFamily="18" charset="0"/>
-                <a:cs typeface="Times New Roman" panose="02020603050405020304" pitchFamily="18" charset="0"/>
-              </a:rPr>
-              <a:t>delay</a:t>
-            </a:r>
-            <a:r>
-              <a:rPr lang="pt-BR" sz="1800" dirty="0">
-                <a:solidFill>
-                  <a:schemeClr val="tx1"/>
-                </a:solidFill>
-                <a:latin typeface="Times New Roman" panose="02020603050405020304" pitchFamily="18" charset="0"/>
-                <a:cs typeface="Times New Roman" panose="02020603050405020304" pitchFamily="18" charset="0"/>
-              </a:rPr>
-              <a:t>(1000); // Espera 1s</a:t>
-            </a:r>
-          </a:p>
-          <a:p>
-            <a:pPr marL="0" indent="0" algn="just">
-              <a:buNone/>
-            </a:pPr>
-            <a:r>
-              <a:rPr lang="pt-BR" sz="1800" dirty="0">
-                <a:solidFill>
-                  <a:schemeClr val="tx1"/>
-                </a:solidFill>
-                <a:latin typeface="Times New Roman" panose="02020603050405020304" pitchFamily="18" charset="0"/>
-                <a:cs typeface="Times New Roman" panose="02020603050405020304" pitchFamily="18" charset="0"/>
-              </a:rPr>
-              <a:t>}</a:t>
+              <a:t>(tempo); // Espera 1s }</a:t>
             </a:r>
           </a:p>
         </p:txBody>
@@ -7526,7 +7506,7 @@
                 <a:cs typeface="Times New Roman" panose="02020603050405020304" pitchFamily="18" charset="0"/>
                 <a:hlinkClick r:id="rId3"/>
               </a:rPr>
-              <a:t>www.tinkercard.com</a:t>
+              <a:t>www.tinkercad.com</a:t>
             </a:r>
             <a:endParaRPr lang="pt-BR" sz="2000" dirty="0">
               <a:solidFill>
@@ -8667,7 +8647,7 @@
                 <a:latin typeface="Times New Roman" panose="02020603050405020304" pitchFamily="18" charset="0"/>
                 <a:cs typeface="Times New Roman" panose="02020603050405020304" pitchFamily="18" charset="0"/>
               </a:rPr>
-              <a:t>:  </a:t>
+              <a:t>:  módulo API </a:t>
             </a:r>
             <a:r>
               <a:rPr lang="pt-BR" sz="2000" dirty="0" err="1">
@@ -8677,7 +8657,7 @@
                 <a:latin typeface="Times New Roman" panose="02020603050405020304" pitchFamily="18" charset="0"/>
                 <a:cs typeface="Times New Roman" panose="02020603050405020304" pitchFamily="18" charset="0"/>
               </a:rPr>
-              <a:t>pyserial</a:t>
+              <a:t>pyhton</a:t>
             </a:r>
             <a:r>
               <a:rPr lang="pt-BR" sz="2000" dirty="0">
@@ -8687,17 +8667,22 @@
                 <a:latin typeface="Times New Roman" panose="02020603050405020304" pitchFamily="18" charset="0"/>
                 <a:cs typeface="Times New Roman" panose="02020603050405020304" pitchFamily="18" charset="0"/>
               </a:rPr>
-              <a:t> é um módulo API </a:t>
-            </a:r>
-            <a:r>
-              <a:rPr lang="pt-BR" sz="2000" dirty="0" err="1">
-                <a:solidFill>
-                  <a:schemeClr val="tx1"/>
-                </a:solidFill>
-                <a:latin typeface="Times New Roman" panose="02020603050405020304" pitchFamily="18" charset="0"/>
-                <a:cs typeface="Times New Roman" panose="02020603050405020304" pitchFamily="18" charset="0"/>
-              </a:rPr>
-              <a:t>pyhton</a:t>
+              <a:t> para ler e gravar dados seriais.</a:t>
+            </a:r>
+          </a:p>
+          <a:p>
+            <a:pPr marL="0" indent="0" algn="just">
+              <a:buNone/>
+            </a:pPr>
+            <a:r>
+              <a:rPr lang="pt-BR" sz="2000" b="1" dirty="0" err="1">
+                <a:solidFill>
+                  <a:srgbClr val="FF0000"/>
+                </a:solidFill>
+                <a:latin typeface="Times New Roman" panose="02020603050405020304" pitchFamily="18" charset="0"/>
+                <a:cs typeface="Times New Roman" panose="02020603050405020304" pitchFamily="18" charset="0"/>
+              </a:rPr>
+              <a:t>Pyfirmata</a:t>
             </a:r>
             <a:r>
               <a:rPr lang="pt-BR" sz="2000" dirty="0">
@@ -8707,14 +8692,51 @@
                 <a:latin typeface="Times New Roman" panose="02020603050405020304" pitchFamily="18" charset="0"/>
                 <a:cs typeface="Times New Roman" panose="02020603050405020304" pitchFamily="18" charset="0"/>
               </a:rPr>
-              <a:t> para ler e gravar dados seriais.</a:t>
-            </a:r>
+              <a:t>: </a:t>
+            </a:r>
+            <a:r>
+              <a:rPr lang="en-US" sz="2000" dirty="0">
+                <a:solidFill>
+                  <a:schemeClr val="tx1"/>
+                </a:solidFill>
+                <a:latin typeface="Times New Roman" panose="02020603050405020304" pitchFamily="18" charset="0"/>
+                <a:cs typeface="Times New Roman" panose="02020603050405020304" pitchFamily="18" charset="0"/>
+              </a:rPr>
+              <a:t>is a Python interface for the </a:t>
+            </a:r>
+            <a:r>
+              <a:rPr lang="en-US" sz="2000" dirty="0" err="1">
+                <a:solidFill>
+                  <a:schemeClr val="tx1"/>
+                </a:solidFill>
+                <a:latin typeface="Times New Roman" panose="02020603050405020304" pitchFamily="18" charset="0"/>
+                <a:cs typeface="Times New Roman" panose="02020603050405020304" pitchFamily="18" charset="0"/>
+              </a:rPr>
+              <a:t>Firmata</a:t>
+            </a:r>
+            <a:r>
+              <a:rPr lang="en-US" sz="2000">
+                <a:solidFill>
+                  <a:schemeClr val="tx1"/>
+                </a:solidFill>
+                <a:latin typeface="Times New Roman" panose="02020603050405020304" pitchFamily="18" charset="0"/>
+                <a:cs typeface="Times New Roman" panose="02020603050405020304" pitchFamily="18" charset="0"/>
+              </a:rPr>
+              <a:t> protocol.</a:t>
+            </a:r>
+            <a:endParaRPr lang="pt-BR" sz="2000" dirty="0">
+              <a:solidFill>
+                <a:schemeClr val="tx1"/>
+              </a:solidFill>
+              <a:latin typeface="Times New Roman" panose="02020603050405020304" pitchFamily="18" charset="0"/>
+              <a:cs typeface="Times New Roman" panose="02020603050405020304" pitchFamily="18" charset="0"/>
+            </a:endParaRPr>
           </a:p>
           <a:p>
             <a:pPr marL="0" indent="0" algn="just">
               <a:buNone/>
             </a:pPr>
-            <a:endParaRPr lang="pt-BR" dirty="0">
+            <a:endParaRPr lang="pt-BR" sz="2000" dirty="0">
               <a:latin typeface="Times New Roman" panose="02020603050405020304" pitchFamily="18" charset="0"/>
               <a:cs typeface="Times New Roman" panose="02020603050405020304" pitchFamily="18" charset="0"/>
               <a:hlinkClick r:id="rId3"/>
@@ -8724,7 +8746,33 @@
             <a:pPr marL="0" indent="0" algn="just">
               <a:buNone/>
             </a:pPr>
-            <a:endParaRPr lang="pt-BR" dirty="0">
+            <a:r>
+              <a:rPr lang="pt-BR" sz="2000" dirty="0">
+                <a:latin typeface="Times New Roman" panose="02020603050405020304" pitchFamily="18" charset="0"/>
+                <a:cs typeface="Times New Roman" panose="02020603050405020304" pitchFamily="18" charset="0"/>
+                <a:hlinkClick r:id="rId3"/>
+              </a:rPr>
+              <a:t>https://pypi.org/project/pyserial/</a:t>
+            </a:r>
+          </a:p>
+          <a:p>
+            <a:pPr marL="0" indent="0" algn="just">
+              <a:buNone/>
+            </a:pPr>
+            <a:r>
+              <a:rPr lang="pt-BR" sz="2000" dirty="0">
+                <a:latin typeface="Times New Roman" panose="02020603050405020304" pitchFamily="18" charset="0"/>
+                <a:cs typeface="Times New Roman" panose="02020603050405020304" pitchFamily="18" charset="0"/>
+                <a:hlinkClick r:id="rId3"/>
+              </a:rPr>
+              <a:t>https://pypi.org/project/pyFirmata/</a:t>
+            </a:r>
+          </a:p>
+          <a:p>
+            <a:pPr marL="0" indent="0" algn="just">
+              <a:buNone/>
+            </a:pPr>
+            <a:endParaRPr lang="pt-BR" sz="2000" dirty="0">
               <a:latin typeface="Times New Roman" panose="02020603050405020304" pitchFamily="18" charset="0"/>
               <a:cs typeface="Times New Roman" panose="02020603050405020304" pitchFamily="18" charset="0"/>
               <a:hlinkClick r:id="rId3"/>
@@ -8735,14 +8783,42 @@
               <a:buNone/>
             </a:pPr>
             <a:r>
-              <a:rPr lang="pt-BR" dirty="0">
+              <a:rPr lang="pt-BR" sz="2000" dirty="0">
                 <a:latin typeface="Times New Roman" panose="02020603050405020304" pitchFamily="18" charset="0"/>
                 <a:cs typeface="Times New Roman" panose="02020603050405020304" pitchFamily="18" charset="0"/>
                 <a:hlinkClick r:id="rId3"/>
               </a:rPr>
-              <a:t>https://roboindia.com/tutorials/python-with-arduino/</a:t>
-            </a:r>
-            <a:endParaRPr lang="pt-BR" dirty="0">
+              <a:t>https://problemsolvingwithpython.com/11-Python-and-External-Hardware/11.03-Controlling-an-LED/</a:t>
+            </a:r>
+          </a:p>
+          <a:p>
+            <a:pPr marL="0" indent="0" algn="just">
+              <a:buNone/>
+            </a:pPr>
+            <a:endParaRPr lang="pt-BR" sz="2000" dirty="0">
+              <a:latin typeface="Times New Roman" panose="02020603050405020304" pitchFamily="18" charset="0"/>
+              <a:cs typeface="Times New Roman" panose="02020603050405020304" pitchFamily="18" charset="0"/>
+              <a:hlinkClick r:id="rId3"/>
+            </a:endParaRPr>
+          </a:p>
+          <a:p>
+            <a:pPr marL="0" indent="0" algn="just">
+              <a:buNone/>
+            </a:pPr>
+            <a:r>
+              <a:rPr lang="pt-BR" sz="2000" dirty="0">
+                <a:latin typeface="Times New Roman" panose="02020603050405020304" pitchFamily="18" charset="0"/>
+                <a:cs typeface="Times New Roman" panose="02020603050405020304" pitchFamily="18" charset="0"/>
+                <a:hlinkClick r:id="rId3"/>
+              </a:rPr>
+              <a:t>https://embarcados.com.br/programando-arduino-com-python-primeiros-passos/</a:t>
+            </a:r>
+          </a:p>
+          <a:p>
+            <a:pPr marL="0" indent="0" algn="just">
+              <a:buNone/>
+            </a:pPr>
+            <a:endParaRPr lang="pt-BR" sz="2000" dirty="0">
               <a:latin typeface="Times New Roman" panose="02020603050405020304" pitchFamily="18" charset="0"/>
               <a:cs typeface="Times New Roman" panose="02020603050405020304" pitchFamily="18" charset="0"/>
             </a:endParaRPr>
@@ -10851,7 +10927,7 @@
                 <a:latin typeface="Times New Roman" panose="02020603050405020304" pitchFamily="18" charset="0"/>
                 <a:cs typeface="Times New Roman" panose="02020603050405020304" pitchFamily="18" charset="0"/>
               </a:rPr>
-              <a:t>Baixo custo de prototipagem</a:t>
+              <a:t>Baixo custo de prototipagem;</a:t>
             </a:r>
           </a:p>
           <a:p>
@@ -10880,7 +10956,7 @@
                 <a:latin typeface="Times New Roman" panose="02020603050405020304" pitchFamily="18" charset="0"/>
                 <a:cs typeface="Times New Roman" panose="02020603050405020304" pitchFamily="18" charset="0"/>
               </a:rPr>
-              <a:t>Softwares de simulação gratuitos disponíveis</a:t>
+              <a:t>Softwares de simulação gratuitos disponíveis;</a:t>
             </a:r>
           </a:p>
           <a:p>
@@ -10909,7 +10985,7 @@
                 <a:latin typeface="Times New Roman" panose="02020603050405020304" pitchFamily="18" charset="0"/>
                 <a:cs typeface="Times New Roman" panose="02020603050405020304" pitchFamily="18" charset="0"/>
               </a:rPr>
-              <a:t>Fácil de programar</a:t>
+              <a:t>Fácil de programar;</a:t>
             </a:r>
           </a:p>
           <a:p>
@@ -10938,7 +11014,7 @@
                 <a:latin typeface="Times New Roman" panose="02020603050405020304" pitchFamily="18" charset="0"/>
                 <a:cs typeface="Times New Roman" panose="02020603050405020304" pitchFamily="18" charset="0"/>
               </a:rPr>
-              <a:t>Grande número de tutoriais, artigos e projetos prontos na internet</a:t>
+              <a:t>Grande número de tutoriais, artigos e projetos prontos na internet;</a:t>
             </a:r>
           </a:p>
           <a:p>

</xml_diff>